<commit_message>
Commit2. Presentation has been updated
</commit_message>
<xml_diff>
--- a/Presentation.pptx
+++ b/Presentation.pptx
@@ -23,6 +23,7 @@
     <p:sldId id="273" r:id="rId17"/>
     <p:sldId id="274" r:id="rId18"/>
     <p:sldId id="275" r:id="rId19"/>
+    <p:sldId id="276" r:id="rId20"/>
   </p:sldIdLst>
   <p:sldSz cx="12192000" cy="6858000"/>
   <p:notesSz cx="6858000" cy="9144000"/>
@@ -4824,8 +4825,8 @@
           </a:p>
         </p:txBody>
       </p:sp>
-      <mc:AlternateContent xmlns:mc="http://schemas.openxmlformats.org/markup-compatibility/2006">
-        <mc:Choice xmlns:a14="http://schemas.microsoft.com/office/drawing/2010/main" Requires="a14">
+      <mc:AlternateContent xmlns:mc="http://schemas.openxmlformats.org/markup-compatibility/2006" xmlns:a14="http://schemas.microsoft.com/office/drawing/2010/main">
+        <mc:Choice Requires="a14">
           <p:graphicFrame>
             <p:nvGraphicFramePr>
               <p:cNvPr id="4" name="Таблица 3">
@@ -5789,7 +5790,7 @@
             </a:graphic>
           </p:graphicFrame>
         </mc:Choice>
-        <mc:Fallback>
+        <mc:Fallback xmlns="">
           <p:graphicFrame>
             <p:nvGraphicFramePr>
               <p:cNvPr id="4" name="Таблица 3">
@@ -8446,8 +8447,8 @@
           </a:p>
         </p:txBody>
       </p:sp>
-      <mc:AlternateContent xmlns:mc="http://schemas.openxmlformats.org/markup-compatibility/2006">
-        <mc:Choice xmlns:a14="http://schemas.microsoft.com/office/drawing/2010/main" Requires="a14">
+      <mc:AlternateContent xmlns:mc="http://schemas.openxmlformats.org/markup-compatibility/2006" xmlns:a14="http://schemas.microsoft.com/office/drawing/2010/main">
+        <mc:Choice Requires="a14">
           <p:graphicFrame>
             <p:nvGraphicFramePr>
               <p:cNvPr id="6" name="Таблица 5">
@@ -9934,7 +9935,7 @@
             </a:graphic>
           </p:graphicFrame>
         </mc:Choice>
-        <mc:Fallback>
+        <mc:Fallback xmlns="">
           <p:graphicFrame>
             <p:nvGraphicFramePr>
               <p:cNvPr id="6" name="Таблица 5">
@@ -11652,8 +11653,8 @@
           </a:p>
         </p:txBody>
       </p:sp>
-      <mc:AlternateContent xmlns:mc="http://schemas.openxmlformats.org/markup-compatibility/2006">
-        <mc:Choice xmlns:a14="http://schemas.microsoft.com/office/drawing/2010/main" Requires="a14">
+      <mc:AlternateContent xmlns:mc="http://schemas.openxmlformats.org/markup-compatibility/2006" xmlns:a14="http://schemas.microsoft.com/office/drawing/2010/main">
+        <mc:Choice Requires="a14">
           <p:sp>
             <p:nvSpPr>
               <p:cNvPr id="3" name="Объект 2">
@@ -11818,7 +11819,7 @@
             </p:txBody>
           </p:sp>
         </mc:Choice>
-        <mc:Fallback>
+        <mc:Fallback xmlns="">
           <p:sp>
             <p:nvSpPr>
               <p:cNvPr id="3" name="Объект 2">
@@ -11866,6 +11867,112 @@
     <p:extLst>
       <p:ext uri="{BB962C8B-B14F-4D97-AF65-F5344CB8AC3E}">
         <p14:creationId xmlns:p14="http://schemas.microsoft.com/office/powerpoint/2010/main" val="466133261"/>
+      </p:ext>
+    </p:extLst>
+  </p:cSld>
+  <p:clrMapOvr>
+    <a:masterClrMapping/>
+  </p:clrMapOvr>
+</p:sld>
+</file>
+
+<file path=ppt/slides/slide19.xml><?xml version="1.0" encoding="utf-8"?>
+<p:sld xmlns:a="http://schemas.openxmlformats.org/drawingml/2006/main" xmlns:r="http://schemas.openxmlformats.org/officeDocument/2006/relationships" xmlns:p="http://schemas.openxmlformats.org/presentationml/2006/main">
+  <p:cSld>
+    <p:spTree>
+      <p:nvGrpSpPr>
+        <p:cNvPr id="1" name=""/>
+        <p:cNvGrpSpPr/>
+        <p:nvPr/>
+      </p:nvGrpSpPr>
+      <p:grpSpPr>
+        <a:xfrm>
+          <a:off x="0" y="0"/>
+          <a:ext cx="0" cy="0"/>
+          <a:chOff x="0" y="0"/>
+          <a:chExt cx="0" cy="0"/>
+        </a:xfrm>
+      </p:grpSpPr>
+      <p:sp>
+        <p:nvSpPr>
+          <p:cNvPr id="2" name="Заголовок 1">
+            <a:extLst>
+              <a:ext uri="{FF2B5EF4-FFF2-40B4-BE49-F238E27FC236}">
+                <a16:creationId xmlns:a16="http://schemas.microsoft.com/office/drawing/2014/main" id="{A637A55D-014F-60A7-0E00-EF697652FA5C}"/>
+              </a:ext>
+            </a:extLst>
+          </p:cNvPr>
+          <p:cNvSpPr>
+            <a:spLocks noGrp="1"/>
+          </p:cNvSpPr>
+          <p:nvPr>
+            <p:ph type="title"/>
+          </p:nvPr>
+        </p:nvSpPr>
+        <p:spPr>
+          <a:xfrm>
+            <a:off x="0" y="2460625"/>
+            <a:ext cx="12192000" cy="1325563"/>
+          </a:xfrm>
+        </p:spPr>
+        <p:txBody>
+          <a:bodyPr>
+            <a:normAutofit/>
+          </a:bodyPr>
+          <a:lstStyle/>
+          <a:p>
+            <a:pPr algn="ctr"/>
+            <a:r>
+              <a:rPr lang="en-GB" sz="6000" b="1" dirty="0"/>
+              <a:t>Thanks for your attention!</a:t>
+            </a:r>
+          </a:p>
+        </p:txBody>
+      </p:sp>
+      <p:sp>
+        <p:nvSpPr>
+          <p:cNvPr id="9" name="TextBox 8">
+            <a:extLst>
+              <a:ext uri="{FF2B5EF4-FFF2-40B4-BE49-F238E27FC236}">
+                <a16:creationId xmlns:a16="http://schemas.microsoft.com/office/drawing/2014/main" id="{2DBFF83F-AD5C-6E8C-08E5-C36700877B9B}"/>
+              </a:ext>
+            </a:extLst>
+          </p:cNvPr>
+          <p:cNvSpPr txBox="1"/>
+          <p:nvPr/>
+        </p:nvSpPr>
+        <p:spPr>
+          <a:xfrm>
+            <a:off x="3079750" y="6425168"/>
+            <a:ext cx="9182100" cy="400110"/>
+          </a:xfrm>
+          <a:prstGeom prst="rect">
+            <a:avLst/>
+          </a:prstGeom>
+          <a:noFill/>
+        </p:spPr>
+        <p:txBody>
+          <a:bodyPr wrap="square">
+            <a:spAutoFit/>
+          </a:bodyPr>
+          <a:lstStyle/>
+          <a:p>
+            <a:r>
+              <a:rPr lang="en-GB" sz="2000" b="1" dirty="0"/>
+              <a:t>Link to code</a:t>
+            </a:r>
+            <a:r>
+              <a:rPr lang="en-GB" sz="2000" dirty="0"/>
+              <a:t>: https://github.com/GitHub-User228/ContinuousMathematicalModelling</a:t>
+            </a:r>
+            <a:endParaRPr lang="ru-RU" sz="2000" dirty="0"/>
+          </a:p>
+        </p:txBody>
+      </p:sp>
+    </p:spTree>
+    <p:extLst>
+      <p:ext uri="{BB962C8B-B14F-4D97-AF65-F5344CB8AC3E}">
+        <p14:creationId xmlns:p14="http://schemas.microsoft.com/office/powerpoint/2010/main" val="1969905814"/>
       </p:ext>
     </p:extLst>
   </p:cSld>
@@ -12045,8 +12152,8 @@
           </a:p>
         </p:txBody>
       </p:sp>
-      <mc:AlternateContent xmlns:mc="http://schemas.openxmlformats.org/markup-compatibility/2006">
-        <mc:Choice xmlns:a14="http://schemas.microsoft.com/office/drawing/2010/main" Requires="a14">
+      <mc:AlternateContent xmlns:mc="http://schemas.openxmlformats.org/markup-compatibility/2006" xmlns:a14="http://schemas.microsoft.com/office/drawing/2010/main">
+        <mc:Choice Requires="a14">
           <p:sp>
             <p:nvSpPr>
               <p:cNvPr id="3" name="Объект 2">
@@ -12244,7 +12351,7 @@
             </p:txBody>
           </p:sp>
         </mc:Choice>
-        <mc:Fallback>
+        <mc:Fallback xmlns="">
           <p:sp>
             <p:nvSpPr>
               <p:cNvPr id="3" name="Объект 2">
@@ -13932,8 +14039,8 @@
           </a:p>
         </p:txBody>
       </p:sp>
-      <mc:AlternateContent xmlns:mc="http://schemas.openxmlformats.org/markup-compatibility/2006">
-        <mc:Choice xmlns:a14="http://schemas.microsoft.com/office/drawing/2010/main" Requires="a14">
+      <mc:AlternateContent xmlns:mc="http://schemas.openxmlformats.org/markup-compatibility/2006" xmlns:a14="http://schemas.microsoft.com/office/drawing/2010/main">
+        <mc:Choice Requires="a14">
           <p:sp>
             <p:nvSpPr>
               <p:cNvPr id="3" name="Объект 2">
@@ -14174,7 +14281,7 @@
             </p:txBody>
           </p:sp>
         </mc:Choice>
-        <mc:Fallback>
+        <mc:Fallback xmlns="">
           <p:sp>
             <p:nvSpPr>
               <p:cNvPr id="3" name="Объект 2">

</xml_diff>